<commit_message>
MOD: actualización articulos y slides respecto a los objetivos del proyecto
</commit_message>
<xml_diff>
--- a/MaterialApoyo/Guias/PresentaciónBúsquedaInformación Ingeniería.pptx
+++ b/MaterialApoyo/Guias/PresentaciónBúsquedaInformación Ingeniería.pptx
@@ -8,7 +8,7 @@
     <p:sldMasterId id="2147483658" r:id="rId4"/>
   </p:sldMasterIdLst>
   <p:notesMasterIdLst>
-    <p:notesMasterId r:id="rId27"/>
+    <p:notesMasterId r:id="rId32"/>
   </p:notesMasterIdLst>
   <p:sldIdLst>
     <p:sldId id="269" r:id="rId5"/>
@@ -32,7 +32,12 @@
     <p:sldId id="291" r:id="rId23"/>
     <p:sldId id="319" r:id="rId24"/>
     <p:sldId id="324" r:id="rId25"/>
-    <p:sldId id="317" r:id="rId26"/>
+    <p:sldId id="350" r:id="rId26"/>
+    <p:sldId id="351" r:id="rId27"/>
+    <p:sldId id="348" r:id="rId28"/>
+    <p:sldId id="347" r:id="rId29"/>
+    <p:sldId id="349" r:id="rId30"/>
+    <p:sldId id="317" r:id="rId31"/>
   </p:sldIdLst>
   <p:sldSz cx="12192000" cy="6858000"/>
   <p:notesSz cx="6858000" cy="9144000"/>
@@ -399,7 +404,7 @@
           <a:p>
             <a:fld id="{877585C9-BE9D-4F37-B05C-FB77CB951A54}" type="datetimeFigureOut">
               <a:rPr lang="es-CO" smtClean="0"/>
-              <a:t>23/09/2022</a:t>
+              <a:t>29/09/2022</a:t>
             </a:fld>
             <a:endParaRPr lang="es-CO"/>
           </a:p>
@@ -558,7 +563,7 @@
           <a:p>
             <a:fld id="{29628573-99E5-4571-A2DF-F00436165D83}" type="slidenum">
               <a:rPr lang="es-CO" smtClean="0"/>
-              <a:t>‹Nº›</a:t>
+              <a:t>‹#›</a:t>
             </a:fld>
             <a:endParaRPr lang="es-CO"/>
           </a:p>
@@ -10168,6 +10173,510 @@
           <a:chExt cx="0" cy="0"/>
         </a:xfrm>
       </p:grpSpPr>
+      <p:pic>
+        <p:nvPicPr>
+          <p:cNvPr id="1026" name="Picture 2" descr="Fig. 3">
+            <a:extLst>
+              <a:ext uri="{FF2B5EF4-FFF2-40B4-BE49-F238E27FC236}">
+                <a16:creationId xmlns:a16="http://schemas.microsoft.com/office/drawing/2014/main" id="{B08EC8C9-20BC-44CC-A0A7-74828EB8AEBB}"/>
+              </a:ext>
+            </a:extLst>
+          </p:cNvPr>
+          <p:cNvPicPr>
+            <a:picLocks noChangeAspect="1" noChangeArrowheads="1"/>
+          </p:cNvPicPr>
+          <p:nvPr/>
+        </p:nvPicPr>
+        <p:blipFill>
+          <a:blip r:embed="rId2">
+            <a:extLst>
+              <a:ext uri="{28A0092B-C50C-407E-A947-70E740481C1C}">
+                <a14:useLocalDpi xmlns:a14="http://schemas.microsoft.com/office/drawing/2010/main" val="0"/>
+              </a:ext>
+            </a:extLst>
+          </a:blip>
+          <a:srcRect/>
+          <a:stretch>
+            <a:fillRect/>
+          </a:stretch>
+        </p:blipFill>
+        <p:spPr bwMode="auto">
+          <a:xfrm>
+            <a:off x="1376363" y="1485900"/>
+            <a:ext cx="9229725" cy="4514850"/>
+          </a:xfrm>
+          <a:prstGeom prst="rect">
+            <a:avLst/>
+          </a:prstGeom>
+          <a:noFill/>
+          <a:extLst>
+            <a:ext uri="{909E8E84-426E-40DD-AFC4-6F175D3DCCD1}">
+              <a14:hiddenFill xmlns:a14="http://schemas.microsoft.com/office/drawing/2010/main">
+                <a:solidFill>
+                  <a:srgbClr val="FFFFFF"/>
+                </a:solidFill>
+              </a14:hiddenFill>
+            </a:ext>
+          </a:extLst>
+        </p:spPr>
+      </p:pic>
+      <p:sp>
+        <p:nvSpPr>
+          <p:cNvPr id="2" name="TextBox 1">
+            <a:extLst>
+              <a:ext uri="{FF2B5EF4-FFF2-40B4-BE49-F238E27FC236}">
+                <a16:creationId xmlns:a16="http://schemas.microsoft.com/office/drawing/2014/main" id="{DEA55802-3032-404A-9BCD-A0B083E6334F}"/>
+              </a:ext>
+            </a:extLst>
+          </p:cNvPr>
+          <p:cNvSpPr txBox="1"/>
+          <p:nvPr/>
+        </p:nvSpPr>
+        <p:spPr>
+          <a:xfrm>
+            <a:off x="986117" y="340659"/>
+            <a:ext cx="3041730" cy="769441"/>
+          </a:xfrm>
+          <a:prstGeom prst="rect">
+            <a:avLst/>
+          </a:prstGeom>
+          <a:noFill/>
+        </p:spPr>
+        <p:txBody>
+          <a:bodyPr wrap="none" rtlCol="0">
+            <a:spAutoFit/>
+          </a:bodyPr>
+          <a:lstStyle/>
+          <a:p>
+            <a:r>
+              <a:rPr lang="es-419" sz="4400" b="1" dirty="0" err="1"/>
+              <a:t>Snowballing</a:t>
+            </a:r>
+            <a:endParaRPr lang="en-US" b="1" dirty="0"/>
+          </a:p>
+        </p:txBody>
+      </p:sp>
+    </p:spTree>
+    <p:extLst>
+      <p:ext uri="{BB962C8B-B14F-4D97-AF65-F5344CB8AC3E}">
+        <p14:creationId xmlns:p14="http://schemas.microsoft.com/office/powerpoint/2010/main" val="960772891"/>
+      </p:ext>
+    </p:extLst>
+  </p:cSld>
+  <p:clrMapOvr>
+    <a:masterClrMapping/>
+  </p:clrMapOvr>
+</p:sld>
+</file>
+
+<file path=ppt/slides/slide23.xml><?xml version="1.0" encoding="utf-8"?>
+<p:sld xmlns:a="http://schemas.openxmlformats.org/drawingml/2006/main" xmlns:r="http://schemas.openxmlformats.org/officeDocument/2006/relationships" xmlns:p="http://schemas.openxmlformats.org/presentationml/2006/main">
+  <p:cSld>
+    <p:spTree>
+      <p:nvGrpSpPr>
+        <p:cNvPr id="1" name=""/>
+        <p:cNvGrpSpPr/>
+        <p:nvPr/>
+      </p:nvGrpSpPr>
+      <p:grpSpPr>
+        <a:xfrm>
+          <a:off x="0" y="0"/>
+          <a:ext cx="0" cy="0"/>
+          <a:chOff x="0" y="0"/>
+          <a:chExt cx="0" cy="0"/>
+        </a:xfrm>
+      </p:grpSpPr>
+      <p:pic>
+        <p:nvPicPr>
+          <p:cNvPr id="3" name="Picture 2">
+            <a:extLst>
+              <a:ext uri="{FF2B5EF4-FFF2-40B4-BE49-F238E27FC236}">
+                <a16:creationId xmlns:a16="http://schemas.microsoft.com/office/drawing/2014/main" id="{CEE71014-CC48-4C3A-9EBE-29355710569F}"/>
+              </a:ext>
+            </a:extLst>
+          </p:cNvPr>
+          <p:cNvPicPr>
+            <a:picLocks noChangeAspect="1"/>
+          </p:cNvPicPr>
+          <p:nvPr/>
+        </p:nvPicPr>
+        <p:blipFill>
+          <a:blip r:embed="rId2"/>
+          <a:stretch>
+            <a:fillRect/>
+          </a:stretch>
+        </p:blipFill>
+        <p:spPr>
+          <a:xfrm>
+            <a:off x="2168787" y="359716"/>
+            <a:ext cx="6741010" cy="4680939"/>
+          </a:xfrm>
+          <a:prstGeom prst="rect">
+            <a:avLst/>
+          </a:prstGeom>
+        </p:spPr>
+      </p:pic>
+      <p:sp>
+        <p:nvSpPr>
+          <p:cNvPr id="5" name="TextBox 4">
+            <a:extLst>
+              <a:ext uri="{FF2B5EF4-FFF2-40B4-BE49-F238E27FC236}">
+                <a16:creationId xmlns:a16="http://schemas.microsoft.com/office/drawing/2014/main" id="{84679DAD-54E7-40A8-BF5F-E7A320D6CDC6}"/>
+              </a:ext>
+            </a:extLst>
+          </p:cNvPr>
+          <p:cNvSpPr txBox="1"/>
+          <p:nvPr/>
+        </p:nvSpPr>
+        <p:spPr>
+          <a:xfrm>
+            <a:off x="2813797" y="5347011"/>
+            <a:ext cx="6096000" cy="923330"/>
+          </a:xfrm>
+          <a:prstGeom prst="rect">
+            <a:avLst/>
+          </a:prstGeom>
+          <a:noFill/>
+        </p:spPr>
+        <p:txBody>
+          <a:bodyPr wrap="square">
+            <a:spAutoFit/>
+          </a:bodyPr>
+          <a:lstStyle/>
+          <a:p>
+            <a:r>
+              <a:rPr lang="en-US" dirty="0"/>
+              <a:t>Fuente: (</a:t>
+            </a:r>
+            <a:r>
+              <a:rPr lang="en-US" dirty="0" err="1"/>
+              <a:t>Mourãoa</a:t>
+            </a:r>
+            <a:r>
+              <a:rPr lang="en-US"/>
+              <a:t>, 2020 )On </a:t>
+            </a:r>
+            <a:r>
+              <a:rPr lang="en-US" dirty="0"/>
+              <a:t>the Performance of Hybrid Search Strategies for Systematic Literature Reviews in Software Engineering</a:t>
+            </a:r>
+          </a:p>
+        </p:txBody>
+      </p:sp>
+    </p:spTree>
+    <p:extLst>
+      <p:ext uri="{BB962C8B-B14F-4D97-AF65-F5344CB8AC3E}">
+        <p14:creationId xmlns:p14="http://schemas.microsoft.com/office/powerpoint/2010/main" val="283012872"/>
+      </p:ext>
+    </p:extLst>
+  </p:cSld>
+  <p:clrMapOvr>
+    <a:masterClrMapping/>
+  </p:clrMapOvr>
+</p:sld>
+</file>
+
+<file path=ppt/slides/slide24.xml><?xml version="1.0" encoding="utf-8"?>
+<p:sld xmlns:a="http://schemas.openxmlformats.org/drawingml/2006/main" xmlns:r="http://schemas.openxmlformats.org/officeDocument/2006/relationships" xmlns:p="http://schemas.openxmlformats.org/presentationml/2006/main">
+  <p:cSld>
+    <p:spTree>
+      <p:nvGrpSpPr>
+        <p:cNvPr id="1" name=""/>
+        <p:cNvGrpSpPr/>
+        <p:nvPr/>
+      </p:nvGrpSpPr>
+      <p:grpSpPr>
+        <a:xfrm>
+          <a:off x="0" y="0"/>
+          <a:ext cx="0" cy="0"/>
+          <a:chOff x="0" y="0"/>
+          <a:chExt cx="0" cy="0"/>
+        </a:xfrm>
+      </p:grpSpPr>
+      <p:sp>
+        <p:nvSpPr>
+          <p:cNvPr id="2" name="TextBox 1">
+            <a:extLst>
+              <a:ext uri="{FF2B5EF4-FFF2-40B4-BE49-F238E27FC236}">
+                <a16:creationId xmlns:a16="http://schemas.microsoft.com/office/drawing/2014/main" id="{DD69734C-7779-4DFB-A6A4-6B3097BA5F6B}"/>
+              </a:ext>
+            </a:extLst>
+          </p:cNvPr>
+          <p:cNvSpPr txBox="1"/>
+          <p:nvPr/>
+        </p:nvSpPr>
+        <p:spPr>
+          <a:xfrm>
+            <a:off x="3119717" y="2590800"/>
+            <a:ext cx="5640235" cy="830997"/>
+          </a:xfrm>
+          <a:prstGeom prst="rect">
+            <a:avLst/>
+          </a:prstGeom>
+          <a:noFill/>
+        </p:spPr>
+        <p:txBody>
+          <a:bodyPr wrap="square" rtlCol="0">
+            <a:spAutoFit/>
+          </a:bodyPr>
+          <a:lstStyle/>
+          <a:p>
+            <a:pPr algn="ctr"/>
+            <a:r>
+              <a:rPr lang="es-419" sz="4800" dirty="0"/>
+              <a:t>Ejemplo</a:t>
+            </a:r>
+            <a:endParaRPr lang="en-US" sz="4800" dirty="0"/>
+          </a:p>
+        </p:txBody>
+      </p:sp>
+      <mc:AlternateContent xmlns:mc="http://schemas.openxmlformats.org/markup-compatibility/2006">
+        <mc:Choice xmlns:pslz="http://schemas.microsoft.com/office/powerpoint/2016/slidezoom" Requires="pslz">
+          <p:graphicFrame>
+            <p:nvGraphicFramePr>
+              <p:cNvPr id="4" name="Slide Zoom 3">
+                <a:extLst>
+                  <a:ext uri="{FF2B5EF4-FFF2-40B4-BE49-F238E27FC236}">
+                    <a16:creationId xmlns:a16="http://schemas.microsoft.com/office/drawing/2014/main" id="{DC72D6DF-D37E-457A-8D6A-BB9D4391C940}"/>
+                  </a:ext>
+                </a:extLst>
+              </p:cNvPr>
+              <p:cNvGraphicFramePr>
+                <a:graphicFrameLocks noChangeAspect="1"/>
+              </p:cNvGraphicFramePr>
+              <p:nvPr>
+                <p:extLst>
+                  <p:ext uri="{D42A27DB-BD31-4B8C-83A1-F6EECF244321}">
+                    <p14:modId xmlns:p14="http://schemas.microsoft.com/office/powerpoint/2010/main" val="1609827126"/>
+                  </p:ext>
+                </p:extLst>
+              </p:nvPr>
+            </p:nvGraphicFramePr>
+            <p:xfrm>
+              <a:off x="-2259106" y="1509432"/>
+              <a:ext cx="3048000" cy="1714500"/>
+            </p:xfrm>
+            <a:graphic>
+              <a:graphicData uri="http://schemas.microsoft.com/office/powerpoint/2016/slidezoom">
+                <pslz:sldZm>
+                  <pslz:sldZmObj sldId="291" cId="3120196504">
+                    <pslz:zmPr id="{E02AB932-A25C-40C7-A14A-E1D95AD8495A}" returnToParent="0" transitionDur="1000">
+                      <p166:blipFill xmlns:p166="http://schemas.microsoft.com/office/powerpoint/2016/6/main">
+                        <a:blip r:embed="rId2"/>
+                        <a:stretch>
+                          <a:fillRect/>
+                        </a:stretch>
+                      </p166:blipFill>
+                      <p166:spPr xmlns:p166="http://schemas.microsoft.com/office/powerpoint/2016/6/main">
+                        <a:xfrm>
+                          <a:off x="0" y="0"/>
+                          <a:ext cx="3048000" cy="1714500"/>
+                        </a:xfrm>
+                        <a:prstGeom prst="rect">
+                          <a:avLst/>
+                        </a:prstGeom>
+                        <a:ln w="3175">
+                          <a:solidFill>
+                            <a:prstClr val="ltGray"/>
+                          </a:solidFill>
+                        </a:ln>
+                      </p166:spPr>
+                    </pslz:zmPr>
+                  </pslz:sldZmObj>
+                </pslz:sldZm>
+              </a:graphicData>
+            </a:graphic>
+          </p:graphicFrame>
+        </mc:Choice>
+        <mc:Fallback>
+          <p:pic>
+            <p:nvPicPr>
+              <p:cNvPr id="4" name="Slide Zoom 3">
+                <a:hlinkClick r:id="rId3" action="ppaction://hlinksldjump"/>
+                <a:extLst>
+                  <a:ext uri="{FF2B5EF4-FFF2-40B4-BE49-F238E27FC236}">
+                    <a16:creationId xmlns:a16="http://schemas.microsoft.com/office/drawing/2014/main" id="{DC72D6DF-D37E-457A-8D6A-BB9D4391C940}"/>
+                  </a:ext>
+                </a:extLst>
+              </p:cNvPr>
+              <p:cNvPicPr>
+                <a:picLocks noGrp="1" noRot="1" noChangeAspect="1" noMove="1" noResize="1" noEditPoints="1" noAdjustHandles="1" noChangeArrowheads="1" noChangeShapeType="1"/>
+              </p:cNvPicPr>
+              <p:nvPr/>
+            </p:nvPicPr>
+            <p:blipFill>
+              <a:blip r:embed="rId2"/>
+              <a:stretch>
+                <a:fillRect/>
+              </a:stretch>
+            </p:blipFill>
+            <p:spPr>
+              <a:xfrm>
+                <a:off x="-2259106" y="1509432"/>
+                <a:ext cx="3048000" cy="1714500"/>
+              </a:xfrm>
+              <a:prstGeom prst="rect">
+                <a:avLst/>
+              </a:prstGeom>
+              <a:ln w="3175">
+                <a:solidFill>
+                  <a:prstClr val="ltGray"/>
+                </a:solidFill>
+              </a:ln>
+            </p:spPr>
+          </p:pic>
+        </mc:Fallback>
+      </mc:AlternateContent>
+    </p:spTree>
+    <p:extLst>
+      <p:ext uri="{BB962C8B-B14F-4D97-AF65-F5344CB8AC3E}">
+        <p14:creationId xmlns:p14="http://schemas.microsoft.com/office/powerpoint/2010/main" val="3156051028"/>
+      </p:ext>
+    </p:extLst>
+  </p:cSld>
+  <p:clrMapOvr>
+    <a:masterClrMapping/>
+  </p:clrMapOvr>
+</p:sld>
+</file>
+
+<file path=ppt/slides/slide25.xml><?xml version="1.0" encoding="utf-8"?>
+<p:sld xmlns:a="http://schemas.openxmlformats.org/drawingml/2006/main" xmlns:r="http://schemas.openxmlformats.org/officeDocument/2006/relationships" xmlns:p="http://schemas.openxmlformats.org/presentationml/2006/main">
+  <p:cSld>
+    <p:spTree>
+      <p:nvGrpSpPr>
+        <p:cNvPr id="1" name=""/>
+        <p:cNvGrpSpPr/>
+        <p:nvPr/>
+      </p:nvGrpSpPr>
+      <p:grpSpPr>
+        <a:xfrm>
+          <a:off x="0" y="0"/>
+          <a:ext cx="0" cy="0"/>
+          <a:chOff x="0" y="0"/>
+          <a:chExt cx="0" cy="0"/>
+        </a:xfrm>
+      </p:grpSpPr>
+      <p:pic>
+        <p:nvPicPr>
+          <p:cNvPr id="3" name="Picture 2">
+            <a:extLst>
+              <a:ext uri="{FF2B5EF4-FFF2-40B4-BE49-F238E27FC236}">
+                <a16:creationId xmlns:a16="http://schemas.microsoft.com/office/drawing/2014/main" id="{E4F6699D-A60C-4BBE-ACA8-4C810E3F747D}"/>
+              </a:ext>
+            </a:extLst>
+          </p:cNvPr>
+          <p:cNvPicPr>
+            <a:picLocks noChangeAspect="1"/>
+          </p:cNvPicPr>
+          <p:nvPr/>
+        </p:nvPicPr>
+        <p:blipFill>
+          <a:blip r:embed="rId2"/>
+          <a:stretch>
+            <a:fillRect/>
+          </a:stretch>
+        </p:blipFill>
+        <p:spPr>
+          <a:xfrm>
+            <a:off x="0" y="229017"/>
+            <a:ext cx="12192000" cy="6399965"/>
+          </a:xfrm>
+          <a:prstGeom prst="rect">
+            <a:avLst/>
+          </a:prstGeom>
+        </p:spPr>
+      </p:pic>
+    </p:spTree>
+    <p:extLst>
+      <p:ext uri="{BB962C8B-B14F-4D97-AF65-F5344CB8AC3E}">
+        <p14:creationId xmlns:p14="http://schemas.microsoft.com/office/powerpoint/2010/main" val="493706891"/>
+      </p:ext>
+    </p:extLst>
+  </p:cSld>
+  <p:clrMapOvr>
+    <a:masterClrMapping/>
+  </p:clrMapOvr>
+</p:sld>
+</file>
+
+<file path=ppt/slides/slide26.xml><?xml version="1.0" encoding="utf-8"?>
+<p:sld xmlns:a="http://schemas.openxmlformats.org/drawingml/2006/main" xmlns:r="http://schemas.openxmlformats.org/officeDocument/2006/relationships" xmlns:p="http://schemas.openxmlformats.org/presentationml/2006/main">
+  <p:cSld>
+    <p:spTree>
+      <p:nvGrpSpPr>
+        <p:cNvPr id="1" name=""/>
+        <p:cNvGrpSpPr/>
+        <p:nvPr/>
+      </p:nvGrpSpPr>
+      <p:grpSpPr>
+        <a:xfrm>
+          <a:off x="0" y="0"/>
+          <a:ext cx="0" cy="0"/>
+          <a:chOff x="0" y="0"/>
+          <a:chExt cx="0" cy="0"/>
+        </a:xfrm>
+      </p:grpSpPr>
+      <p:pic>
+        <p:nvPicPr>
+          <p:cNvPr id="3" name="Picture 2">
+            <a:extLst>
+              <a:ext uri="{FF2B5EF4-FFF2-40B4-BE49-F238E27FC236}">
+                <a16:creationId xmlns:a16="http://schemas.microsoft.com/office/drawing/2014/main" id="{CFD2BFA4-E7BE-40CB-9BA7-1E1E3AFBA4E1}"/>
+              </a:ext>
+            </a:extLst>
+          </p:cNvPr>
+          <p:cNvPicPr>
+            <a:picLocks noChangeAspect="1"/>
+          </p:cNvPicPr>
+          <p:nvPr/>
+        </p:nvPicPr>
+        <p:blipFill>
+          <a:blip r:embed="rId2"/>
+          <a:stretch>
+            <a:fillRect/>
+          </a:stretch>
+        </p:blipFill>
+        <p:spPr>
+          <a:xfrm>
+            <a:off x="70596" y="332943"/>
+            <a:ext cx="12050807" cy="6192114"/>
+          </a:xfrm>
+          <a:prstGeom prst="rect">
+            <a:avLst/>
+          </a:prstGeom>
+        </p:spPr>
+      </p:pic>
+    </p:spTree>
+    <p:extLst>
+      <p:ext uri="{BB962C8B-B14F-4D97-AF65-F5344CB8AC3E}">
+        <p14:creationId xmlns:p14="http://schemas.microsoft.com/office/powerpoint/2010/main" val="3292185958"/>
+      </p:ext>
+    </p:extLst>
+  </p:cSld>
+  <p:clrMapOvr>
+    <a:masterClrMapping/>
+  </p:clrMapOvr>
+</p:sld>
+</file>
+
+<file path=ppt/slides/slide27.xml><?xml version="1.0" encoding="utf-8"?>
+<p:sld xmlns:a="http://schemas.openxmlformats.org/drawingml/2006/main" xmlns:r="http://schemas.openxmlformats.org/officeDocument/2006/relationships" xmlns:p="http://schemas.openxmlformats.org/presentationml/2006/main">
+  <p:cSld>
+    <p:spTree>
+      <p:nvGrpSpPr>
+        <p:cNvPr id="1" name=""/>
+        <p:cNvGrpSpPr/>
+        <p:nvPr/>
+      </p:nvGrpSpPr>
+      <p:grpSpPr>
+        <a:xfrm>
+          <a:off x="0" y="0"/>
+          <a:ext cx="0" cy="0"/>
+          <a:chOff x="0" y="0"/>
+          <a:chExt cx="0" cy="0"/>
+        </a:xfrm>
+      </p:grpSpPr>
       <p:sp>
         <p:nvSpPr>
           <p:cNvPr id="3" name="CuadroTexto 2"/>
@@ -13289,14 +13798,14 @@
           <p:nvPr>
             <p:extLst>
               <p:ext uri="{D42A27DB-BD31-4B8C-83A1-F6EECF244321}">
-                <p14:modId xmlns:p14="http://schemas.microsoft.com/office/powerpoint/2010/main" val="3745747545"/>
+                <p14:modId xmlns:p14="http://schemas.microsoft.com/office/powerpoint/2010/main" val="1798302468"/>
               </p:ext>
             </p:extLst>
           </p:nvPr>
         </p:nvGraphicFramePr>
         <p:xfrm>
           <a:off x="1683480" y="2532017"/>
-          <a:ext cx="9098251" cy="2610089"/>
+          <a:ext cx="9098251" cy="2244329"/>
         </p:xfrm>
         <a:graphic>
           <a:graphicData uri="http://schemas.openxmlformats.org/drawingml/2006/table">
@@ -13576,66 +14085,6 @@
                 <a:extLst>
                   <a:ext uri="{0D108BD9-81ED-4DB2-BD59-A6C34878D82A}">
                     <a16:rowId xmlns:a16="http://schemas.microsoft.com/office/drawing/2014/main" val="93474957"/>
-                  </a:ext>
-                </a:extLst>
-              </a:tr>
-              <a:tr h="324690">
-                <a:tc>
-                  <a:txBody>
-                    <a:bodyPr/>
-                    <a:lstStyle/>
-                    <a:p>
-                      <a:pPr marL="0" marR="0" lvl="0" indent="0" algn="l" defTabSz="914400" rtl="0" eaLnBrk="1" fontAlgn="auto" latinLnBrk="0" hangingPunct="1">
-                        <a:lnSpc>
-                          <a:spcPct val="100000"/>
-                        </a:lnSpc>
-                        <a:spcBef>
-                          <a:spcPts val="0"/>
-                        </a:spcBef>
-                        <a:spcAft>
-                          <a:spcPts val="0"/>
-                        </a:spcAft>
-                        <a:buClrTx/>
-                        <a:buSzTx/>
-                        <a:buFontTx/>
-                        <a:buNone/>
-                        <a:tabLst/>
-                        <a:defRPr/>
-                      </a:pPr>
-                      <a:r>
-                        <a:rPr lang="es-ES" sz="1800" i="1" dirty="0">
-                          <a:latin typeface="+mn-lt"/>
-                        </a:rPr>
-                        <a:t>Software</a:t>
-                      </a:r>
-                      <a:endParaRPr lang="es-CO" sz="1800" dirty="0">
-                        <a:latin typeface="+mn-lt"/>
-                      </a:endParaRPr>
-                    </a:p>
-                  </a:txBody>
-                  <a:tcPr/>
-                </a:tc>
-                <a:tc>
-                  <a:txBody>
-                    <a:bodyPr/>
-                    <a:lstStyle/>
-                    <a:p>
-                      <a:pPr algn="l"/>
-                      <a:r>
-                        <a:rPr lang="es-CO" b="0" u="sng" dirty="0">
-                          <a:solidFill>
-                            <a:srgbClr val="002060"/>
-                          </a:solidFill>
-                        </a:rPr>
-                        <a:t>Programa de ordenador</a:t>
-                      </a:r>
-                    </a:p>
-                  </a:txBody>
-                  <a:tcPr/>
-                </a:tc>
-                <a:extLst>
-                  <a:ext uri="{0D108BD9-81ED-4DB2-BD59-A6C34878D82A}">
-                    <a16:rowId xmlns:a16="http://schemas.microsoft.com/office/drawing/2014/main" val="1469759807"/>
                   </a:ext>
                 </a:extLst>
               </a:tr>

</xml_diff>

<commit_message>
NEW: actualización de rúbrica de presentación oral
</commit_message>
<xml_diff>
--- a/MaterialApoyo/Guias/PresentaciónBúsquedaInformación Ingeniería.pptx
+++ b/MaterialApoyo/Guias/PresentaciónBúsquedaInformación Ingeniería.pptx
@@ -322,6 +322,38 @@
 </pc:chgInfo>
 </file>
 
+<file path=ppt/ink/ink1.xml><?xml version="1.0" encoding="utf-8"?>
+<inkml:ink xmlns:inkml="http://www.w3.org/2003/InkML">
+  <inkml:definitions>
+    <inkml:context xml:id="ctx0">
+      <inkml:inkSource xml:id="inkSrc0">
+        <inkml:traceFormat>
+          <inkml:channel name="X" type="integer" max="3280" units="cm"/>
+          <inkml:channel name="Y" type="integer" min="-188" max="892" units="cm"/>
+          <inkml:channel name="T" type="integer" max="2.14748E9" units="dev"/>
+        </inkml:traceFormat>
+        <inkml:channelProperties>
+          <inkml:channelProperty channel="X" name="resolution" value="80" units="1/cm"/>
+          <inkml:channelProperty channel="Y" name="resolution" value="46.95652" units="1/cm"/>
+          <inkml:channelProperty channel="T" name="resolution" value="1" units="1/dev"/>
+        </inkml:channelProperties>
+      </inkml:inkSource>
+      <inkml:timestamp xml:id="ts0" timeString="2022-09-30T20:43:36.713"/>
+    </inkml:context>
+    <inkml:brush xml:id="br0">
+      <inkml:brushProperty name="width" value="0.05292" units="cm"/>
+      <inkml:brushProperty name="height" value="0.05292" units="cm"/>
+      <inkml:brushProperty name="color" value="#FF0000"/>
+    </inkml:brush>
+  </inkml:definitions>
+  <inkml:trace contextRef="#ctx0" brushRef="#br0">15849 6761 0,'0'37'47,"38"-37"0,36 0-47,39 0 16,-1 0-16,0 0 15,-37 0 1,-1 0-16,39 0 16,73-37-16,-111 37 15,-37 0-15,36 0 16,1 0-16,-38 0 15,1-38-15,37 38 16,37 0-16,-75 0 16,38-37-16,-38 0 15,1 37-15,-1 0 16,-37-38-16,37 38 16,-37 38 62,-37-38-63,0 0-15</inkml:trace>
+  <inkml:trace contextRef="#ctx0" brushRef="#br0" timeOffset="2312.44">16410 5229 0,'0'38'125,"0"-1"-110,0 0-15,0 1 16,37-38-16,-37 74 15,38-36-15,-38-1 16,0 0 0,37-37-16,-37 38 15,0-1 48,0 1-48</inkml:trace>
+  <inkml:trace contextRef="#ctx0" brushRef="#br0" timeOffset="3283.32">16186 5603 0,'37'0'79,"0"0"-79,1 0 62,-1 0-46,1 0-1,-1 37 1,-37 1 0,75-1-16,-38 0 15,1-37 1,-1 38-16,0-38 172,1 0-141,-38-38-31,0 1 31,0 0-15,0-1-1,37 1 1</inkml:trace>
+  <inkml:trace contextRef="#ctx0" brushRef="#br0" timeOffset="6870.52">15625 5416 0,'0'-37'32,"0"-1"-17,-37 38-15,37-37 16,-38 0 0,1 37-1,37-38 1,-38 38-16,1 0 15,0-37 1,-1 0 0,-36-1-16,36 1 15,-74-38-15,-75 0 16,75 1-16,37 36 16,1 1-1,36 0-15,1 37 16,-1 0-1,-36 0-15,-39 0 16,76 0-16,-38 0 16,38 0-16,-75 0 15,37 0 1,-74 37 0,111-37-16,-37 0 15,38 0-15,0 37 16,-1-37-1,38 38-15,-37-38 16,-38 0 0,38 37-1,-1 0-15,-36-37 16,-1 0-16,37 75 16,-36-75-16,36 0 15,38 38 1,-37-38-16,0 0 0,37 37 15,-75-37 1,37 0-16,1 0 16,0 0-16,-1 37 15</inkml:trace>
+  <inkml:trace contextRef="#ctx0" brushRef="#br0" timeOffset="7741.57">12709 4632 0,'0'37'109,"0"0"-109,0 75 31,0-74-31,0-1 16,0 0 0,0 1-1,-37-38 16,37 37-15,0 1-16,0-1 16,-37 0-1,-1 38-15,38 0 32,38-75 46,36 0-78,1 0 15,0 0-15,-38 0 16,1 0-16,-1 0 16,0 0-1,1 37-15,-1-37 16,1 0-1,-1 0-15,0 0 16,1 37 0,-1-37-1</inkml:trace>
+</inkml:ink>
+</file>
+
 <file path=ppt/notesMasters/notesMaster1.xml><?xml version="1.0" encoding="utf-8"?>
 <p:notesMaster xmlns:a="http://schemas.openxmlformats.org/drawingml/2006/main" xmlns:r="http://schemas.openxmlformats.org/officeDocument/2006/relationships" xmlns:p="http://schemas.openxmlformats.org/presentationml/2006/main">
   <p:cSld>
@@ -404,7 +436,7 @@
           <a:p>
             <a:fld id="{877585C9-BE9D-4F37-B05C-FB77CB951A54}" type="datetimeFigureOut">
               <a:rPr lang="es-CO" smtClean="0"/>
-              <a:t>29/09/2022</a:t>
+              <a:t>30/09/2022</a:t>
             </a:fld>
             <a:endParaRPr lang="es-CO"/>
           </a:p>
@@ -10363,6 +10395,57 @@
           </a:p>
         </p:txBody>
       </p:sp>
+      <mc:AlternateContent xmlns:mc="http://schemas.openxmlformats.org/markup-compatibility/2006">
+        <mc:Choice xmlns:p14="http://schemas.microsoft.com/office/powerpoint/2010/main" Requires="p14">
+          <p:contentPart p14:bwMode="auto" r:id="rId3">
+            <p14:nvContentPartPr>
+              <p14:cNvPr id="2" name="Ink 1">
+                <a:extLst>
+                  <a:ext uri="{FF2B5EF4-FFF2-40B4-BE49-F238E27FC236}">
+                    <a16:creationId xmlns:a16="http://schemas.microsoft.com/office/drawing/2014/main" id="{08FCD437-22FC-4678-9D93-E2981BF11F4B}"/>
+                  </a:ext>
+                </a:extLst>
+              </p14:cNvPr>
+              <p14:cNvContentPartPr/>
+              <p14:nvPr/>
+            </p14:nvContentPartPr>
+            <p14:xfrm>
+              <a:off x="4534920" y="1667520"/>
+              <a:ext cx="1776600" cy="780120"/>
+            </p14:xfrm>
+          </p:contentPart>
+        </mc:Choice>
+        <mc:Fallback>
+          <p:pic>
+            <p:nvPicPr>
+              <p:cNvPr id="2" name="Ink 1">
+                <a:extLst>
+                  <a:ext uri="{FF2B5EF4-FFF2-40B4-BE49-F238E27FC236}">
+                    <a16:creationId xmlns:a16="http://schemas.microsoft.com/office/drawing/2014/main" id="{08FCD437-22FC-4678-9D93-E2981BF11F4B}"/>
+                  </a:ext>
+                </a:extLst>
+              </p:cNvPr>
+              <p:cNvPicPr/>
+              <p:nvPr/>
+            </p:nvPicPr>
+            <p:blipFill>
+              <a:blip r:embed="rId4"/>
+              <a:stretch>
+                <a:fillRect/>
+              </a:stretch>
+            </p:blipFill>
+            <p:spPr>
+              <a:xfrm>
+                <a:off x="4525560" y="1658160"/>
+                <a:ext cx="1795320" cy="798840"/>
+              </a:xfrm>
+              <a:prstGeom prst="rect">
+                <a:avLst/>
+              </a:prstGeom>
+            </p:spPr>
+          </p:pic>
+        </mc:Fallback>
+      </mc:AlternateContent>
     </p:spTree>
     <p:extLst>
       <p:ext uri="{BB962C8B-B14F-4D97-AF65-F5344CB8AC3E}">
@@ -10430,8 +10513,8 @@
           </a:p>
         </p:txBody>
       </p:sp>
-      <mc:AlternateContent xmlns:mc="http://schemas.openxmlformats.org/markup-compatibility/2006">
-        <mc:Choice xmlns:pslz="http://schemas.microsoft.com/office/powerpoint/2016/slidezoom" Requires="pslz">
+      <mc:AlternateContent xmlns:mc="http://schemas.openxmlformats.org/markup-compatibility/2006" xmlns:pslz="http://schemas.microsoft.com/office/powerpoint/2016/slidezoom">
+        <mc:Choice Requires="pslz">
           <p:graphicFrame>
             <p:nvGraphicFramePr>
               <p:cNvPr id="4" name="Slide Zoom 3">
@@ -10488,7 +10571,7 @@
             </a:graphic>
           </p:graphicFrame>
         </mc:Choice>
-        <mc:Fallback>
+        <mc:Fallback xmlns="">
           <p:pic>
             <p:nvPicPr>
               <p:cNvPr id="4" name="Slide Zoom 3">
@@ -10505,7 +10588,7 @@
               <p:nvPr/>
             </p:nvPicPr>
             <p:blipFill>
-              <a:blip r:embed="rId2"/>
+              <a:blip r:embed="rId4"/>
               <a:stretch>
                 <a:fillRect/>
               </a:stretch>

</xml_diff>